<commit_message>
updated slides and graphics
</commit_message>
<xml_diff>
--- a/intro to Python .pptx
+++ b/intro to Python .pptx
@@ -705,7 +705,7 @@
           <a:p>
             <a:fld id="{9A44FA51-ED7C-EA4C-859B-48693E4FB6E2}" type="datetimeFigureOut">
               <a:rPr lang="en-US" smtClean="0"/>
-              <a:t>2/25/19</a:t>
+              <a:t>2/26/2019</a:t>
             </a:fld>
             <a:endParaRPr lang="en-US"/>
           </a:p>
@@ -1203,7 +1203,7 @@
           <a:p>
             <a:fld id="{4D4618C5-B88F-804D-B49B-5927AC1A1D9D}" type="datetimeFigureOut">
               <a:rPr lang="en-US" smtClean="0"/>
-              <a:t>2/25/19</a:t>
+              <a:t>2/26/2019</a:t>
             </a:fld>
             <a:endParaRPr lang="en-US"/>
           </a:p>
@@ -1401,7 +1401,7 @@
           <a:p>
             <a:fld id="{4D4618C5-B88F-804D-B49B-5927AC1A1D9D}" type="datetimeFigureOut">
               <a:rPr lang="en-US" smtClean="0"/>
-              <a:t>2/25/19</a:t>
+              <a:t>2/26/2019</a:t>
             </a:fld>
             <a:endParaRPr lang="en-US"/>
           </a:p>
@@ -1609,7 +1609,7 @@
           <a:p>
             <a:fld id="{4D4618C5-B88F-804D-B49B-5927AC1A1D9D}" type="datetimeFigureOut">
               <a:rPr lang="en-US" smtClean="0"/>
-              <a:t>2/25/19</a:t>
+              <a:t>2/26/2019</a:t>
             </a:fld>
             <a:endParaRPr lang="en-US"/>
           </a:p>
@@ -1807,7 +1807,7 @@
           <a:p>
             <a:fld id="{4D4618C5-B88F-804D-B49B-5927AC1A1D9D}" type="datetimeFigureOut">
               <a:rPr lang="en-US" smtClean="0"/>
-              <a:t>2/25/19</a:t>
+              <a:t>2/26/2019</a:t>
             </a:fld>
             <a:endParaRPr lang="en-US"/>
           </a:p>
@@ -2082,7 +2082,7 @@
           <a:p>
             <a:fld id="{4D4618C5-B88F-804D-B49B-5927AC1A1D9D}" type="datetimeFigureOut">
               <a:rPr lang="en-US" smtClean="0"/>
-              <a:t>2/25/19</a:t>
+              <a:t>2/26/2019</a:t>
             </a:fld>
             <a:endParaRPr lang="en-US"/>
           </a:p>
@@ -2347,7 +2347,7 @@
           <a:p>
             <a:fld id="{4D4618C5-B88F-804D-B49B-5927AC1A1D9D}" type="datetimeFigureOut">
               <a:rPr lang="en-US" smtClean="0"/>
-              <a:t>2/25/19</a:t>
+              <a:t>2/26/2019</a:t>
             </a:fld>
             <a:endParaRPr lang="en-US"/>
           </a:p>
@@ -2759,7 +2759,7 @@
           <a:p>
             <a:fld id="{4D4618C5-B88F-804D-B49B-5927AC1A1D9D}" type="datetimeFigureOut">
               <a:rPr lang="en-US" smtClean="0"/>
-              <a:t>2/25/19</a:t>
+              <a:t>2/26/2019</a:t>
             </a:fld>
             <a:endParaRPr lang="en-US"/>
           </a:p>
@@ -2900,7 +2900,7 @@
           <a:p>
             <a:fld id="{4D4618C5-B88F-804D-B49B-5927AC1A1D9D}" type="datetimeFigureOut">
               <a:rPr lang="en-US" smtClean="0"/>
-              <a:t>2/25/19</a:t>
+              <a:t>2/26/2019</a:t>
             </a:fld>
             <a:endParaRPr lang="en-US"/>
           </a:p>
@@ -3013,7 +3013,7 @@
           <a:p>
             <a:fld id="{4D4618C5-B88F-804D-B49B-5927AC1A1D9D}" type="datetimeFigureOut">
               <a:rPr lang="en-US" smtClean="0"/>
-              <a:t>2/25/19</a:t>
+              <a:t>2/26/2019</a:t>
             </a:fld>
             <a:endParaRPr lang="en-US"/>
           </a:p>
@@ -3324,7 +3324,7 @@
           <a:p>
             <a:fld id="{4D4618C5-B88F-804D-B49B-5927AC1A1D9D}" type="datetimeFigureOut">
               <a:rPr lang="en-US" smtClean="0"/>
-              <a:t>2/25/19</a:t>
+              <a:t>2/26/2019</a:t>
             </a:fld>
             <a:endParaRPr lang="en-US"/>
           </a:p>
@@ -3612,7 +3612,7 @@
           <a:p>
             <a:fld id="{4D4618C5-B88F-804D-B49B-5927AC1A1D9D}" type="datetimeFigureOut">
               <a:rPr lang="en-US" smtClean="0"/>
-              <a:t>2/25/19</a:t>
+              <a:t>2/26/2019</a:t>
             </a:fld>
             <a:endParaRPr lang="en-US"/>
           </a:p>
@@ -3853,7 +3853,7 @@
           <a:p>
             <a:fld id="{4D4618C5-B88F-804D-B49B-5927AC1A1D9D}" type="datetimeFigureOut">
               <a:rPr lang="en-US" smtClean="0"/>
-              <a:t>2/25/19</a:t>
+              <a:t>2/26/2019</a:t>
             </a:fld>
             <a:endParaRPr lang="en-US"/>
           </a:p>
@@ -6816,18 +6816,34 @@
             <p:ph idx="1"/>
           </p:nvPr>
         </p:nvSpPr>
-        <p:spPr/>
+        <p:spPr>
+          <a:xfrm>
+            <a:off x="838200" y="1661219"/>
+            <a:ext cx="10515600" cy="4351338"/>
+          </a:xfrm>
+        </p:spPr>
         <p:txBody>
           <a:bodyPr/>
           <a:lstStyle/>
           <a:p>
             <a:r>
               <a:rPr lang="en-US" dirty="0"/>
-              <a:t>Bar chart is a good choice when you want to show some quantity varies among discrete set of items.</a:t>
-            </a:r>
-          </a:p>
-          <a:p>
-            <a:endParaRPr lang="en-US" dirty="0"/>
+              <a:t>Using bar chart is a good choice when you want to show how a certain quantity varies among discrete set of items.</a:t>
+            </a:r>
+          </a:p>
+          <a:p>
+            <a:r>
+              <a:rPr lang="en-US" dirty="0"/>
+              <a:t>Histograms are frequently used to show brief information about the distribution of a </a:t>
+            </a:r>
+            <a:r>
+              <a:rPr lang="en-US" altLang="zh-CN" dirty="0"/>
+              <a:t>(discrete or continuous)</a:t>
+            </a:r>
+            <a:r>
+              <a:rPr lang="en-US" dirty="0"/>
+              <a:t> variable.</a:t>
+            </a:r>
           </a:p>
         </p:txBody>
       </p:sp>
@@ -7678,7 +7694,7 @@
         <p:spPr>
           <a:xfrm>
             <a:off x="1226598" y="959385"/>
-            <a:ext cx="8157098" cy="5355312"/>
+            <a:ext cx="8157098" cy="1200329"/>
           </a:xfrm>
           <a:prstGeom prst="rect">
             <a:avLst/>
@@ -7697,13 +7713,64 @@
             </a:pPr>
             <a:r>
               <a:rPr lang="en-US" altLang="zh-CN" dirty="0"/>
-              <a:t>Read data into a vector or list from the console or file</a:t>
+              <a:t>Open and read a file in python</a:t>
             </a:r>
           </a:p>
           <a:p>
             <a:r>
               <a:rPr lang="en-US" altLang="zh-CN" dirty="0"/>
-              <a:t>	scan()</a:t>
+              <a:t>	</a:t>
+            </a:r>
+            <a:r>
+              <a:rPr lang="zh-CN" altLang="zh-CN" dirty="0"/>
+              <a:t>file_object  = open(“filename”, “mode”) </a:t>
+            </a:r>
+            <a:endParaRPr lang="en-US" altLang="zh-CN" dirty="0"/>
+          </a:p>
+          <a:p>
+            <a:r>
+              <a:rPr lang="en-US" altLang="zh-CN" dirty="0"/>
+              <a:t>	</a:t>
+            </a:r>
+            <a:r>
+              <a:rPr lang="zh-CN" altLang="zh-CN" dirty="0"/>
+              <a:t>file_object</a:t>
+            </a:r>
+            <a:r>
+              <a:rPr lang="en-US" altLang="zh-CN" dirty="0"/>
+              <a:t>.read, </a:t>
+            </a:r>
+            <a:r>
+              <a:rPr lang="zh-CN" altLang="zh-CN" dirty="0"/>
+              <a:t>file_object</a:t>
+            </a:r>
+            <a:r>
+              <a:rPr lang="en-US" altLang="zh-CN" dirty="0"/>
+              <a:t>.</a:t>
+            </a:r>
+            <a:r>
+              <a:rPr lang="en-US" altLang="zh-CN" dirty="0" err="1"/>
+              <a:t>readline</a:t>
+            </a:r>
+            <a:r>
+              <a:rPr lang="en-US" altLang="zh-CN" dirty="0"/>
+              <a:t>(), </a:t>
+            </a:r>
+            <a:r>
+              <a:rPr lang="zh-CN" altLang="zh-CN" dirty="0"/>
+              <a:t>file_object</a:t>
+            </a:r>
+            <a:r>
+              <a:rPr lang="en-US" altLang="zh-CN" dirty="0"/>
+              <a:t>.</a:t>
+            </a:r>
+            <a:r>
+              <a:rPr lang="en-US" altLang="zh-CN" dirty="0" err="1"/>
+              <a:t>readlines</a:t>
+            </a:r>
+            <a:r>
+              <a:rPr lang="en-US" altLang="zh-CN" dirty="0"/>
+              <a:t>()</a:t>
             </a:r>
           </a:p>
           <a:p>
@@ -7713,201 +7780,68 @@
             </a:pPr>
             <a:r>
               <a:rPr lang="en-US" altLang="zh-CN" dirty="0"/>
-              <a:t>Spreadsheet-like data</a:t>
-            </a:r>
-          </a:p>
-          <a:p>
-            <a:r>
-              <a:rPr lang="en-US" altLang="zh-CN" dirty="0"/>
-              <a:t>	</a:t>
-            </a:r>
-            <a:r>
-              <a:rPr lang="en-US" altLang="zh-CN" dirty="0" err="1"/>
-              <a:t>read.table</a:t>
-            </a:r>
-            <a:r>
-              <a:rPr lang="en-US" altLang="zh-CN" dirty="0"/>
-              <a:t>()</a:t>
-            </a:r>
-          </a:p>
-          <a:p>
-            <a:r>
-              <a:rPr lang="en-US" altLang="zh-CN" dirty="0"/>
-              <a:t>	read.csv()</a:t>
-            </a:r>
-          </a:p>
-          <a:p>
-            <a:pPr marL="285750" indent="-285750">
-              <a:buFont typeface="Wingdings" panose="05000000000000000000" pitchFamily="2" charset="2"/>
-              <a:buChar char="Ø"/>
-            </a:pPr>
-            <a:r>
-              <a:rPr lang="en-US" altLang="zh-CN" dirty="0"/>
-              <a:t>Other statistical systems (‘foreign’ package)</a:t>
-            </a:r>
-          </a:p>
-          <a:p>
-            <a:pPr lvl="1"/>
-            <a:r>
-              <a:rPr lang="en-US" altLang="zh-CN" dirty="0"/>
-              <a:t>	SAS Transport format (</a:t>
-            </a:r>
-            <a:r>
-              <a:rPr lang="en-US" altLang="zh-CN" dirty="0" err="1"/>
-              <a:t>read.xport</a:t>
-            </a:r>
-            <a:r>
-              <a:rPr lang="en-US" altLang="zh-CN" dirty="0"/>
-              <a:t>)</a:t>
-            </a:r>
-          </a:p>
-          <a:p>
-            <a:r>
-              <a:rPr lang="en-US" altLang="zh-CN" dirty="0"/>
-              <a:t>	Minitab Portable Worksheet (</a:t>
-            </a:r>
-            <a:r>
-              <a:rPr lang="en-US" altLang="zh-CN" dirty="0" err="1"/>
-              <a:t>read.mtp</a:t>
-            </a:r>
-            <a:r>
-              <a:rPr lang="en-US" altLang="zh-CN" dirty="0"/>
-              <a:t>)</a:t>
-            </a:r>
-          </a:p>
-          <a:p>
-            <a:r>
-              <a:rPr lang="en-US" altLang="zh-CN" dirty="0"/>
-              <a:t>	Stata .</a:t>
-            </a:r>
-            <a:r>
-              <a:rPr lang="en-US" altLang="zh-CN" dirty="0" err="1"/>
-              <a:t>dta</a:t>
-            </a:r>
-            <a:r>
-              <a:rPr lang="en-US" altLang="zh-CN" dirty="0"/>
-              <a:t> files(</a:t>
-            </a:r>
-            <a:r>
-              <a:rPr lang="en-US" altLang="zh-CN" dirty="0" err="1"/>
-              <a:t>read.dts</a:t>
-            </a:r>
-            <a:r>
-              <a:rPr lang="en-US" altLang="zh-CN" dirty="0"/>
-              <a:t>)</a:t>
-            </a:r>
-          </a:p>
-          <a:p>
-            <a:pPr marL="285750" indent="-285750">
-              <a:buFont typeface="Wingdings" panose="05000000000000000000" pitchFamily="2" charset="2"/>
-              <a:buChar char="Ø"/>
-            </a:pPr>
-            <a:r>
-              <a:rPr lang="en-US" altLang="zh-CN" dirty="0"/>
-              <a:t>R interface for Database management(SQL)</a:t>
-            </a:r>
-          </a:p>
-          <a:p>
-            <a:r>
-              <a:rPr lang="en-US" altLang="zh-CN" dirty="0"/>
-              <a:t>	‘</a:t>
-            </a:r>
-            <a:r>
-              <a:rPr lang="en-US" altLang="zh-CN" dirty="0" err="1"/>
-              <a:t>RMySQL</a:t>
-            </a:r>
-            <a:r>
-              <a:rPr lang="en-US" altLang="zh-CN" dirty="0"/>
-              <a:t>’, ‘</a:t>
-            </a:r>
-            <a:r>
-              <a:rPr lang="en-US" altLang="zh-CN" dirty="0" err="1"/>
-              <a:t>ROracle</a:t>
-            </a:r>
-            <a:r>
-              <a:rPr lang="en-US" altLang="zh-CN" dirty="0"/>
-              <a:t>’, ‘</a:t>
-            </a:r>
-            <a:r>
-              <a:rPr lang="en-US" altLang="zh-CN" dirty="0" err="1"/>
-              <a:t>RSQLite</a:t>
-            </a:r>
-            <a:r>
-              <a:rPr lang="en-US" altLang="zh-CN" dirty="0"/>
-              <a:t>’</a:t>
-            </a:r>
-          </a:p>
-          <a:p>
-            <a:pPr marL="285750" indent="-285750">
-              <a:buFont typeface="Wingdings" panose="05000000000000000000" pitchFamily="2" charset="2"/>
-              <a:buChar char="Ø"/>
-            </a:pPr>
-            <a:r>
-              <a:rPr lang="en-US" altLang="zh-CN" dirty="0"/>
-              <a:t>Others</a:t>
-            </a:r>
-          </a:p>
-          <a:p>
-            <a:r>
-              <a:rPr lang="en-US" altLang="zh-CN" dirty="0"/>
-              <a:t>	json (‘</a:t>
-            </a:r>
-            <a:r>
-              <a:rPr lang="en-US" altLang="zh-CN" dirty="0" err="1"/>
-              <a:t>rjson</a:t>
-            </a:r>
-            <a:r>
-              <a:rPr lang="en-US" altLang="zh-CN" dirty="0"/>
-              <a:t>’)</a:t>
-            </a:r>
-          </a:p>
-          <a:p>
-            <a:r>
-              <a:rPr lang="en-US" altLang="zh-CN" dirty="0"/>
-              <a:t>	image(‘bmp’, ’jpeg’, ‘</a:t>
-            </a:r>
-            <a:r>
-              <a:rPr lang="en-US" altLang="zh-CN" dirty="0" err="1"/>
-              <a:t>png</a:t>
-            </a:r>
-            <a:r>
-              <a:rPr lang="en-US" altLang="zh-CN" dirty="0"/>
-              <a:t>’, ‘</a:t>
-            </a:r>
-            <a:r>
-              <a:rPr lang="en-US" altLang="zh-CN" dirty="0" err="1"/>
-              <a:t>rtiff</a:t>
-            </a:r>
-            <a:r>
-              <a:rPr lang="en-US" altLang="zh-CN" dirty="0"/>
-              <a:t>’, ‘</a:t>
-            </a:r>
-            <a:r>
-              <a:rPr lang="en-US" altLang="zh-CN" dirty="0" err="1"/>
-              <a:t>pixmap</a:t>
-            </a:r>
-            <a:r>
-              <a:rPr lang="en-US" altLang="zh-CN" dirty="0"/>
-              <a:t>’)</a:t>
-            </a:r>
-          </a:p>
-          <a:p>
-            <a:r>
-              <a:rPr lang="en-US" altLang="zh-CN" dirty="0"/>
-              <a:t>	binary file(‘h5’, ‘</a:t>
-            </a:r>
-            <a:r>
-              <a:rPr lang="en-US" altLang="zh-CN" dirty="0" err="1"/>
-              <a:t>RNetCDF</a:t>
-            </a:r>
-            <a:r>
-              <a:rPr lang="en-US" altLang="zh-CN" dirty="0"/>
-              <a:t>’)</a:t>
-            </a:r>
-          </a:p>
-          <a:p>
-            <a:endParaRPr lang="en-US" altLang="zh-CN" dirty="0"/>
-          </a:p>
+              <a:t>Use IO tools in pandas</a:t>
+            </a:r>
+          </a:p>
+        </p:txBody>
+      </p:sp>
+      <p:pic>
+        <p:nvPicPr>
+          <p:cNvPr id="10" name="图片 9">
+            <a:extLst>
+              <a:ext uri="{FF2B5EF4-FFF2-40B4-BE49-F238E27FC236}">
+                <a16:creationId xmlns:a16="http://schemas.microsoft.com/office/drawing/2014/main" id="{03384641-7C8A-41E9-9059-6765086D4F0C}"/>
+              </a:ext>
+            </a:extLst>
+          </p:cNvPr>
+          <p:cNvPicPr>
+            <a:picLocks noChangeAspect="1"/>
+          </p:cNvPicPr>
+          <p:nvPr/>
+        </p:nvPicPr>
+        <p:blipFill>
+          <a:blip r:embed="rId2"/>
+          <a:stretch>
+            <a:fillRect/>
+          </a:stretch>
+        </p:blipFill>
+        <p:spPr>
+          <a:xfrm>
+            <a:off x="1819467" y="2237242"/>
+            <a:ext cx="7587051" cy="3277150"/>
+          </a:xfrm>
+          <a:prstGeom prst="rect">
+            <a:avLst/>
+          </a:prstGeom>
+        </p:spPr>
+      </p:pic>
+      <p:sp>
+        <p:nvSpPr>
+          <p:cNvPr id="11" name="文本框 10">
+            <a:extLst>
+              <a:ext uri="{FF2B5EF4-FFF2-40B4-BE49-F238E27FC236}">
+                <a16:creationId xmlns:a16="http://schemas.microsoft.com/office/drawing/2014/main" id="{79E47524-7D04-473F-A138-D765253D2813}"/>
+              </a:ext>
+            </a:extLst>
+          </p:cNvPr>
+          <p:cNvSpPr txBox="1"/>
+          <p:nvPr/>
+        </p:nvSpPr>
+        <p:spPr>
+          <a:xfrm>
+            <a:off x="1322774" y="5696139"/>
+            <a:ext cx="9377266" cy="923330"/>
+          </a:xfrm>
+          <a:prstGeom prst="rect">
+            <a:avLst/>
+          </a:prstGeom>
+          <a:noFill/>
+        </p:spPr>
+        <p:txBody>
+          <a:bodyPr wrap="square" rtlCol="0">
+            <a:spAutoFit/>
+          </a:bodyPr>
+          <a:lstStyle/>
           <a:p>
             <a:r>
               <a:rPr lang="en-US" altLang="zh-CN" dirty="0"/>
@@ -7917,17 +7851,14 @@
           <a:p>
             <a:r>
               <a:rPr lang="en-US" altLang="zh-CN" dirty="0">
-                <a:hlinkClick r:id="rId2"/>
+                <a:hlinkClick r:id="rId3"/>
               </a:rPr>
-              <a:t>https://cran.r-project.org/doc/manuals/r-release/R-data.pdf</a:t>
+              <a:t>https://pandas.pydata.org/pandas-docs/stable/user_guide/io.html</a:t>
             </a:r>
             <a:endParaRPr lang="en-US" altLang="zh-CN" dirty="0"/>
           </a:p>
           <a:p>
-            <a:r>
-              <a:rPr lang="en-US" altLang="zh-CN" dirty="0"/>
-              <a:t>And check documentations for the packages above</a:t>
-            </a:r>
+            <a:endParaRPr lang="zh-CN" altLang="en-US" dirty="0"/>
           </a:p>
         </p:txBody>
       </p:sp>

</xml_diff>